<commit_message>
Added steps for backpropagation algorithm
</commit_message>
<xml_diff>
--- a/utils/power_point_diagrams/math_model_neuron.pptx
+++ b/utils/power_point_diagrams/math_model_neuron.pptx
@@ -4215,7 +4215,7 @@
         </p:nvSpPr>
         <p:spPr>
           <a:xfrm>
-            <a:off x="4022176" y="3759551"/>
+            <a:off x="4054449" y="3296972"/>
             <a:ext cx="302004" cy="302004"/>
           </a:xfrm>
           <a:prstGeom prst="ellipse">
@@ -4264,7 +4264,7 @@
         </p:nvCxnSpPr>
         <p:spPr>
           <a:xfrm flipH="1">
-            <a:off x="4173178" y="2092332"/>
+            <a:off x="4205451" y="1629753"/>
             <a:ext cx="564499" cy="1667219"/>
           </a:xfrm>
           <a:prstGeom prst="straightConnector1">
@@ -4300,7 +4300,7 @@
         </p:nvCxnSpPr>
         <p:spPr>
           <a:xfrm flipH="1">
-            <a:off x="4324180" y="2069974"/>
+            <a:off x="4356453" y="1607395"/>
             <a:ext cx="2821408" cy="1840579"/>
           </a:xfrm>
           <a:prstGeom prst="straightConnector1">
@@ -4336,7 +4336,7 @@
         </p:nvCxnSpPr>
         <p:spPr>
           <a:xfrm>
-            <a:off x="4173178" y="4061555"/>
+            <a:off x="4205451" y="3598976"/>
             <a:ext cx="751460" cy="1417675"/>
           </a:xfrm>
           <a:prstGeom prst="straightConnector1">
@@ -4371,7 +4371,7 @@
             </p:nvSpPr>
             <p:spPr>
               <a:xfrm>
-                <a:off x="3972377" y="3747560"/>
+                <a:off x="4004650" y="3284981"/>
                 <a:ext cx="407419" cy="309765"/>
               </a:xfrm>
               <a:prstGeom prst="rect">
@@ -4442,7 +4442,7 @@
             </p:nvSpPr>
             <p:spPr>
               <a:xfrm>
-                <a:off x="3972377" y="3747560"/>
+                <a:off x="4004650" y="3284981"/>
                 <a:ext cx="407419" cy="309765"/>
               </a:xfrm>
               <a:prstGeom prst="rect">
@@ -4481,7 +4481,7 @@
         </p:nvCxnSpPr>
         <p:spPr>
           <a:xfrm>
-            <a:off x="2803107" y="1934725"/>
+            <a:off x="2835380" y="1472146"/>
             <a:ext cx="1219069" cy="1975828"/>
           </a:xfrm>
           <a:prstGeom prst="straightConnector1">
@@ -4516,7 +4516,7 @@
             </p:nvSpPr>
             <p:spPr>
               <a:xfrm>
-                <a:off x="2478979" y="1780836"/>
+                <a:off x="2511252" y="1318257"/>
                 <a:ext cx="324128" cy="307777"/>
               </a:xfrm>
               <a:prstGeom prst="rect">
@@ -4560,7 +4560,7 @@
             </p:nvSpPr>
             <p:spPr>
               <a:xfrm>
-                <a:off x="2478979" y="1780836"/>
+                <a:off x="2511252" y="1318257"/>
                 <a:ext cx="324128" cy="307777"/>
               </a:xfrm>
               <a:prstGeom prst="rect">
@@ -4596,7 +4596,7 @@
         </p:nvSpPr>
         <p:spPr>
           <a:xfrm>
-            <a:off x="5489397" y="3759551"/>
+            <a:off x="5521670" y="3296972"/>
             <a:ext cx="311364" cy="303402"/>
           </a:xfrm>
           <a:prstGeom prst="ellipse">
@@ -4645,7 +4645,7 @@
         </p:nvCxnSpPr>
         <p:spPr>
           <a:xfrm flipH="1">
-            <a:off x="5075640" y="4062953"/>
+            <a:off x="5107913" y="3600374"/>
             <a:ext cx="569439" cy="1567279"/>
           </a:xfrm>
           <a:prstGeom prst="straightConnector1">
@@ -4680,7 +4680,7 @@
             </p:nvSpPr>
             <p:spPr>
               <a:xfrm>
-                <a:off x="6493759" y="2758843"/>
+                <a:off x="6526032" y="2296264"/>
                 <a:ext cx="537198" cy="329577"/>
               </a:xfrm>
               <a:prstGeom prst="rect">
@@ -4751,7 +4751,7 @@
             </p:nvSpPr>
             <p:spPr>
               <a:xfrm>
-                <a:off x="6493759" y="2758843"/>
+                <a:off x="6526032" y="2296264"/>
                 <a:ext cx="537198" cy="329577"/>
               </a:xfrm>
               <a:prstGeom prst="rect">
@@ -4789,7 +4789,7 @@
             </p:nvSpPr>
             <p:spPr>
               <a:xfrm>
-                <a:off x="6938833" y="1758029"/>
+                <a:off x="6971106" y="1295450"/>
                 <a:ext cx="413510" cy="311945"/>
               </a:xfrm>
               <a:prstGeom prst="rect">
@@ -4860,7 +4860,7 @@
             </p:nvSpPr>
             <p:spPr>
               <a:xfrm>
-                <a:off x="6938833" y="1758029"/>
+                <a:off x="6971106" y="1295450"/>
                 <a:ext cx="413510" cy="311945"/>
               </a:xfrm>
               <a:prstGeom prst="rect">
@@ -4898,7 +4898,7 @@
             </p:nvSpPr>
             <p:spPr>
               <a:xfrm>
-                <a:off x="4530922" y="1780836"/>
+                <a:off x="4563195" y="1318257"/>
                 <a:ext cx="413510" cy="311496"/>
               </a:xfrm>
               <a:prstGeom prst="rect">
@@ -4969,7 +4969,7 @@
             </p:nvSpPr>
             <p:spPr>
               <a:xfrm>
-                <a:off x="4530922" y="1780836"/>
+                <a:off x="4563195" y="1318257"/>
                 <a:ext cx="413510" cy="311496"/>
               </a:xfrm>
               <a:prstGeom prst="rect">
@@ -5007,7 +5007,7 @@
             </p:nvSpPr>
             <p:spPr>
               <a:xfrm>
-                <a:off x="4469547" y="2555559"/>
+                <a:off x="4501820" y="2092980"/>
                 <a:ext cx="533031" cy="329129"/>
               </a:xfrm>
               <a:prstGeom prst="rect">
@@ -5080,7 +5080,7 @@
             </p:nvSpPr>
             <p:spPr>
               <a:xfrm>
-                <a:off x="4469547" y="2555559"/>
+                <a:off x="4501820" y="2092980"/>
                 <a:ext cx="533031" cy="329129"/>
               </a:xfrm>
               <a:prstGeom prst="rect">
@@ -5118,7 +5118,7 @@
             </p:nvSpPr>
             <p:spPr>
               <a:xfrm>
-                <a:off x="5105496" y="2758843"/>
+                <a:off x="5137769" y="2296264"/>
                 <a:ext cx="533031" cy="329577"/>
               </a:xfrm>
               <a:prstGeom prst="rect">
@@ -5191,7 +5191,7 @@
             </p:nvSpPr>
             <p:spPr>
               <a:xfrm>
-                <a:off x="5105496" y="2758843"/>
+                <a:off x="5137769" y="2296264"/>
                 <a:ext cx="533031" cy="329577"/>
               </a:xfrm>
               <a:prstGeom prst="rect">
@@ -5229,7 +5229,7 @@
             </p:nvSpPr>
             <p:spPr>
               <a:xfrm>
-                <a:off x="5842025" y="2758844"/>
+                <a:off x="5874298" y="2296265"/>
                 <a:ext cx="537198" cy="329577"/>
               </a:xfrm>
               <a:prstGeom prst="rect">
@@ -5302,7 +5302,7 @@
             </p:nvSpPr>
             <p:spPr>
               <a:xfrm>
-                <a:off x="5842025" y="2758844"/>
+                <a:off x="5874298" y="2296265"/>
                 <a:ext cx="537198" cy="329577"/>
               </a:xfrm>
               <a:prstGeom prst="rect">
@@ -5340,7 +5340,7 @@
             </p:nvSpPr>
             <p:spPr>
               <a:xfrm>
-                <a:off x="3213903" y="2553778"/>
+                <a:off x="3246176" y="2091199"/>
                 <a:ext cx="537198" cy="329577"/>
               </a:xfrm>
               <a:prstGeom prst="rect">
@@ -5411,7 +5411,7 @@
             </p:nvSpPr>
             <p:spPr>
               <a:xfrm>
-                <a:off x="3213903" y="2553778"/>
+                <a:off x="3246176" y="2091199"/>
                 <a:ext cx="537198" cy="329577"/>
               </a:xfrm>
               <a:prstGeom prst="rect">
@@ -5449,7 +5449,7 @@
             </p:nvSpPr>
             <p:spPr>
               <a:xfrm>
-                <a:off x="3875300" y="2553779"/>
+                <a:off x="3907573" y="2091200"/>
                 <a:ext cx="537198" cy="329577"/>
               </a:xfrm>
               <a:prstGeom prst="rect">
@@ -5520,7 +5520,7 @@
             </p:nvSpPr>
             <p:spPr>
               <a:xfrm>
-                <a:off x="3875300" y="2553779"/>
+                <a:off x="3907573" y="2091200"/>
                 <a:ext cx="537198" cy="329577"/>
               </a:xfrm>
               <a:prstGeom prst="rect">
@@ -5559,7 +5559,7 @@
         </p:nvCxnSpPr>
         <p:spPr>
           <a:xfrm>
-            <a:off x="4737677" y="2092332"/>
+            <a:off x="4769950" y="1629753"/>
             <a:ext cx="907402" cy="1667219"/>
           </a:xfrm>
           <a:prstGeom prst="straightConnector1">
@@ -5595,7 +5595,7 @@
         </p:nvCxnSpPr>
         <p:spPr>
           <a:xfrm flipH="1">
-            <a:off x="5800761" y="2069974"/>
+            <a:off x="5833034" y="1607395"/>
             <a:ext cx="1344827" cy="1841278"/>
           </a:xfrm>
           <a:prstGeom prst="straightConnector1">
@@ -5631,7 +5631,7 @@
         </p:nvCxnSpPr>
         <p:spPr>
           <a:xfrm>
-            <a:off x="2803107" y="1934725"/>
+            <a:off x="2835380" y="1472146"/>
             <a:ext cx="2686290" cy="1976527"/>
           </a:xfrm>
           <a:prstGeom prst="straightConnector1">
@@ -5666,7 +5666,7 @@
             </p:nvSpPr>
             <p:spPr>
               <a:xfrm>
-                <a:off x="5376480" y="4406556"/>
+                <a:off x="5408753" y="3943977"/>
                 <a:ext cx="537198" cy="327782"/>
               </a:xfrm>
               <a:prstGeom prst="rect">
@@ -5737,7 +5737,7 @@
             </p:nvSpPr>
             <p:spPr>
               <a:xfrm>
-                <a:off x="5376480" y="4406556"/>
+                <a:off x="5408753" y="3943977"/>
                 <a:ext cx="537198" cy="327782"/>
               </a:xfrm>
               <a:prstGeom prst="rect">
@@ -5775,7 +5775,7 @@
             </p:nvSpPr>
             <p:spPr>
               <a:xfrm>
-                <a:off x="4408672" y="4407004"/>
+                <a:off x="4440945" y="3944425"/>
                 <a:ext cx="533031" cy="327334"/>
               </a:xfrm>
               <a:prstGeom prst="rect">
@@ -5846,7 +5846,7 @@
             </p:nvSpPr>
             <p:spPr>
               <a:xfrm>
-                <a:off x="4408672" y="4407004"/>
+                <a:off x="4440945" y="3944425"/>
                 <a:ext cx="533031" cy="327334"/>
               </a:xfrm>
               <a:prstGeom prst="rect">
@@ -5884,7 +5884,7 @@
             </p:nvSpPr>
             <p:spPr>
               <a:xfrm>
-                <a:off x="2476190" y="3692223"/>
+                <a:off x="2508463" y="3229644"/>
                 <a:ext cx="324128" cy="307777"/>
               </a:xfrm>
               <a:prstGeom prst="rect">
@@ -5928,7 +5928,7 @@
             </p:nvSpPr>
             <p:spPr>
               <a:xfrm>
-                <a:off x="2476190" y="3692223"/>
+                <a:off x="2508463" y="3229644"/>
                 <a:ext cx="324128" cy="307777"/>
               </a:xfrm>
               <a:prstGeom prst="rect">
@@ -5967,7 +5967,7 @@
         </p:nvCxnSpPr>
         <p:spPr>
           <a:xfrm>
-            <a:off x="2638254" y="4000000"/>
+            <a:off x="2670527" y="3537421"/>
             <a:ext cx="2135382" cy="1630232"/>
           </a:xfrm>
           <a:prstGeom prst="straightConnector1">
@@ -6002,7 +6002,7 @@
             </p:nvSpPr>
             <p:spPr>
               <a:xfrm>
-                <a:off x="3333976" y="4406556"/>
+                <a:off x="3366249" y="3943977"/>
                 <a:ext cx="537198" cy="327782"/>
               </a:xfrm>
               <a:prstGeom prst="rect">
@@ -6073,7 +6073,7 @@
             </p:nvSpPr>
             <p:spPr>
               <a:xfrm>
-                <a:off x="3333976" y="4406556"/>
+                <a:off x="3366249" y="3943977"/>
                 <a:ext cx="537198" cy="327782"/>
               </a:xfrm>
               <a:prstGeom prst="rect">
@@ -6109,7 +6109,7 @@
         </p:nvSpPr>
         <p:spPr>
           <a:xfrm>
-            <a:off x="4773636" y="5479230"/>
+            <a:off x="4805909" y="5016651"/>
             <a:ext cx="302004" cy="302004"/>
           </a:xfrm>
           <a:prstGeom prst="ellipse">
@@ -6157,7 +6157,7 @@
             </p:nvSpPr>
             <p:spPr>
               <a:xfrm>
-                <a:off x="5434606" y="3736269"/>
+                <a:off x="5466879" y="3273690"/>
                 <a:ext cx="407419" cy="310150"/>
               </a:xfrm>
               <a:prstGeom prst="rect">
@@ -6228,7 +6228,7 @@
             </p:nvSpPr>
             <p:spPr>
               <a:xfrm>
-                <a:off x="5434606" y="3736269"/>
+                <a:off x="5466879" y="3273690"/>
                 <a:ext cx="407419" cy="310150"/>
               </a:xfrm>
               <a:prstGeom prst="rect">
@@ -6266,7 +6266,7 @@
             </p:nvSpPr>
             <p:spPr>
               <a:xfrm>
-                <a:off x="4702303" y="5470322"/>
+                <a:off x="4734576" y="5007743"/>
                 <a:ext cx="411266" cy="310213"/>
               </a:xfrm>
               <a:prstGeom prst="rect">
@@ -6337,7 +6337,7 @@
             </p:nvSpPr>
             <p:spPr>
               <a:xfrm>
-                <a:off x="4702303" y="5470322"/>
+                <a:off x="4734576" y="5007743"/>
                 <a:ext cx="411266" cy="310213"/>
               </a:xfrm>
               <a:prstGeom prst="rect">
@@ -6375,7 +6375,7 @@
         </p:nvCxnSpPr>
         <p:spPr>
           <a:xfrm>
-            <a:off x="4924638" y="5781234"/>
+            <a:off x="4956911" y="5318655"/>
             <a:ext cx="0" cy="334488"/>
           </a:xfrm>
           <a:prstGeom prst="straightConnector1">
@@ -6400,6 +6400,108 @@
           </a:fontRef>
         </p:style>
       </p:cxnSp>
+      <mc:AlternateContent xmlns:mc="http://schemas.openxmlformats.org/markup-compatibility/2006">
+        <mc:Choice xmlns:a14="http://schemas.microsoft.com/office/drawing/2010/main" Requires="a14">
+          <p:sp>
+            <p:nvSpPr>
+              <p:cNvPr id="117" name="TextBox 116"/>
+              <p:cNvSpPr txBox="1"/>
+              <p:nvPr/>
+            </p:nvSpPr>
+            <p:spPr>
+              <a:xfrm>
+                <a:off x="4849798" y="5679128"/>
+                <a:ext cx="214226" cy="215444"/>
+              </a:xfrm>
+              <a:prstGeom prst="rect">
+                <a:avLst/>
+              </a:prstGeom>
+              <a:noFill/>
+            </p:spPr>
+            <p:txBody>
+              <a:bodyPr wrap="none" lIns="0" tIns="0" rIns="0" bIns="0" rtlCol="0">
+                <a:spAutoFit/>
+              </a:bodyPr>
+              <a:lstStyle/>
+              <a:p>
+                <a14:m>
+                  <m:oMathPara xmlns:m="http://schemas.openxmlformats.org/officeDocument/2006/math">
+                    <m:oMathParaPr>
+                      <m:jc m:val="centerGroup"/>
+                    </m:oMathParaPr>
+                    <m:oMath xmlns:m="http://schemas.openxmlformats.org/officeDocument/2006/math">
+                      <m:sSub>
+                        <m:sSubPr>
+                          <m:ctrlPr>
+                            <a:rPr lang="en-CA" sz="1400" i="1" smtClean="0">
+                              <a:latin typeface="Cambria Math" panose="02040503050406030204" pitchFamily="18" charset="0"/>
+                            </a:rPr>
+                          </m:ctrlPr>
+                        </m:sSubPr>
+                        <m:e>
+                          <m:r>
+                            <a:rPr lang="en-CA" sz="1400" b="0" i="1" smtClean="0">
+                              <a:latin typeface="Cambria Math" panose="02040503050406030204" pitchFamily="18" charset="0"/>
+                            </a:rPr>
+                            <m:t>𝑦</m:t>
+                          </m:r>
+                        </m:e>
+                        <m:sub>
+                          <m:r>
+                            <a:rPr lang="en-CA" sz="1400" b="0" i="1" smtClean="0">
+                              <a:latin typeface="Cambria Math" panose="02040503050406030204" pitchFamily="18" charset="0"/>
+                            </a:rPr>
+                            <m:t>1</m:t>
+                          </m:r>
+                        </m:sub>
+                      </m:sSub>
+                    </m:oMath>
+                  </m:oMathPara>
+                </a14:m>
+                <a:endParaRPr lang="en-CA" sz="1400" dirty="0"/>
+              </a:p>
+            </p:txBody>
+          </p:sp>
+        </mc:Choice>
+        <mc:Fallback>
+          <p:sp>
+            <p:nvSpPr>
+              <p:cNvPr id="117" name="TextBox 116"/>
+              <p:cNvSpPr txBox="1">
+                <a:spLocks noRot="1" noChangeAspect="1" noMove="1" noResize="1" noEditPoints="1" noAdjustHandles="1" noChangeArrowheads="1" noChangeShapeType="1" noTextEdit="1"/>
+              </p:cNvSpPr>
+              <p:nvPr/>
+            </p:nvSpPr>
+            <p:spPr>
+              <a:xfrm>
+                <a:off x="4849798" y="5679128"/>
+                <a:ext cx="214226" cy="215444"/>
+              </a:xfrm>
+              <a:prstGeom prst="rect">
+                <a:avLst/>
+              </a:prstGeom>
+              <a:blipFill rotWithShape="0">
+                <a:blip r:embed="rId18"/>
+                <a:stretch>
+                  <a:fillRect l="-22857" r="-2857" b="-22857"/>
+                </a:stretch>
+              </a:blipFill>
+            </p:spPr>
+            <p:txBody>
+              <a:bodyPr/>
+              <a:lstStyle/>
+              <a:p>
+                <a:r>
+                  <a:rPr lang="en-CA">
+                    <a:noFill/>
+                  </a:rPr>
+                  <a:t> </a:t>
+                </a:r>
+              </a:p>
+            </p:txBody>
+          </p:sp>
+        </mc:Fallback>
+      </mc:AlternateContent>
     </p:spTree>
     <p:extLst>
       <p:ext uri="{BB962C8B-B14F-4D97-AF65-F5344CB8AC3E}">

</xml_diff>